<commit_message>
correct size of scratch-nompiio
</commit_message>
<xml_diff>
--- a/presentations/jasmin-workshop-overview.pptx
+++ b/presentations/jasmin-workshop-overview.pptx
@@ -217,7 +217,7 @@
           <a:p>
             <a:fld id="{0A05A54A-7050-AA43-B296-91EBEA7AE3FC}" type="datetimeFigureOut">
               <a:rPr lang="en-US" smtClean="0"/>
-              <a:t>6/26/19</a:t>
+              <a:t>7/2/19</a:t>
             </a:fld>
             <a:endParaRPr lang="en-US"/>
           </a:p>
@@ -1189,7 +1189,7 @@
             <a:fld id="{646265C4-D3EB-4033-9F2F-7AE1FCA20C43}" type="datetimeFigureOut">
               <a:rPr lang="en-GB" smtClean="0"/>
               <a:pPr/>
-              <a:t>26/06/2019</a:t>
+              <a:t>02/07/2019</a:t>
             </a:fld>
             <a:endParaRPr lang="en-GB" dirty="0"/>
           </a:p>
@@ -1479,7 +1479,7 @@
             <a:fld id="{646265C4-D3EB-4033-9F2F-7AE1FCA20C43}" type="datetimeFigureOut">
               <a:rPr lang="en-GB" smtClean="0"/>
               <a:pPr/>
-              <a:t>26/06/2019</a:t>
+              <a:t>02/07/2019</a:t>
             </a:fld>
             <a:endParaRPr lang="en-GB" dirty="0"/>
           </a:p>
@@ -1718,7 +1718,7 @@
             <a:fld id="{646265C4-D3EB-4033-9F2F-7AE1FCA20C43}" type="datetimeFigureOut">
               <a:rPr lang="en-GB" smtClean="0"/>
               <a:pPr/>
-              <a:t>26/06/2019</a:t>
+              <a:t>02/07/2019</a:t>
             </a:fld>
             <a:endParaRPr lang="en-GB" dirty="0"/>
           </a:p>
@@ -22143,8 +22143,12 @@
           <a:p>
             <a:pPr algn="r"/>
             <a:r>
+              <a:rPr lang="en-US" sz="900"/>
+              <a:t>175 </a:t>
+            </a:r>
+            <a:r>
               <a:rPr lang="en-US" sz="900" dirty="0"/>
-              <a:t>250 Tb    /work/scratch-</a:t>
+              <a:t>Tb    /work/scratch-</a:t>
             </a:r>
             <a:r>
               <a:rPr lang="en-US" sz="900" dirty="0" err="1"/>

</xml_diff>

<commit_message>
corrected xfc mount info
</commit_message>
<xml_diff>
--- a/presentations/jasmin-workshop-overview.pptx
+++ b/presentations/jasmin-workshop-overview.pptx
@@ -217,7 +217,7 @@
           <a:p>
             <a:fld id="{0A05A54A-7050-AA43-B296-91EBEA7AE3FC}" type="datetimeFigureOut">
               <a:rPr lang="en-US" smtClean="0"/>
-              <a:t>7/2/19</a:t>
+              <a:t>7/10/19</a:t>
             </a:fld>
             <a:endParaRPr lang="en-US"/>
           </a:p>
@@ -1189,7 +1189,7 @@
             <a:fld id="{646265C4-D3EB-4033-9F2F-7AE1FCA20C43}" type="datetimeFigureOut">
               <a:rPr lang="en-GB" smtClean="0"/>
               <a:pPr/>
-              <a:t>02/07/2019</a:t>
+              <a:t>10/07/2019</a:t>
             </a:fld>
             <a:endParaRPr lang="en-GB" dirty="0"/>
           </a:p>
@@ -1479,7 +1479,7 @@
             <a:fld id="{646265C4-D3EB-4033-9F2F-7AE1FCA20C43}" type="datetimeFigureOut">
               <a:rPr lang="en-GB" smtClean="0"/>
               <a:pPr/>
-              <a:t>02/07/2019</a:t>
+              <a:t>10/07/2019</a:t>
             </a:fld>
             <a:endParaRPr lang="en-GB" dirty="0"/>
           </a:p>
@@ -1718,7 +1718,7 @@
             <a:fld id="{646265C4-D3EB-4033-9F2F-7AE1FCA20C43}" type="datetimeFigureOut">
               <a:rPr lang="en-GB" smtClean="0"/>
               <a:pPr/>
-              <a:t>02/07/2019</a:t>
+              <a:t>10/07/2019</a:t>
             </a:fld>
             <a:endParaRPr lang="en-GB" dirty="0"/>
           </a:p>
@@ -25646,7 +25646,7 @@
           <p:nvPr>
             <p:extLst>
               <p:ext uri="{D42A27DB-BD31-4B8C-83A1-F6EECF244321}">
-                <p14:modId xmlns:p14="http://schemas.microsoft.com/office/powerpoint/2010/main" val="2618333816"/>
+                <p14:modId xmlns:p14="http://schemas.microsoft.com/office/powerpoint/2010/main" val="2718255712"/>
               </p:ext>
             </p:extLst>
           </p:nvPr>
@@ -26277,14 +26277,20 @@
                         <a:defRPr/>
                       </a:pPr>
                       <a:r>
-                        <a:rPr lang="en-US" sz="1400" dirty="0">
+                        <a:rPr lang="en-US" sz="1400">
                           <a:solidFill>
-                            <a:srgbClr val="00B050"/>
+                            <a:srgbClr val="FF0000"/>
                           </a:solidFill>
                           <a:latin typeface="Webdings" pitchFamily="2" charset="2"/>
                         </a:rPr>
-                        <a:t>a</a:t>
+                        <a:t>r</a:t>
                       </a:r>
+                      <a:endParaRPr lang="en-US" sz="1400" dirty="0">
+                        <a:solidFill>
+                          <a:srgbClr val="00B050"/>
+                        </a:solidFill>
+                        <a:latin typeface="Webdings" pitchFamily="2" charset="2"/>
+                      </a:endParaRPr>
                     </a:p>
                   </a:txBody>
                   <a:tcPr marL="68580" marR="68580" marT="34290" marB="34290"/>

</xml_diff>